<commit_message>
Add missing reference to LBFGS in PyTorch
</commit_message>
<xml_diff>
--- a/intro picture.pptx
+++ b/intro picture.pptx
@@ -3342,6 +3342,238 @@
           <a:chExt cx="0" cy="0"/>
         </a:xfrm>
       </p:grpSpPr>
+      <p:pic>
+        <p:nvPicPr>
+          <p:cNvPr id="7" name="Picture 6">
+            <a:extLst>
+              <a:ext uri="{FF2B5EF4-FFF2-40B4-BE49-F238E27FC236}">
+                <a16:creationId xmlns:a16="http://schemas.microsoft.com/office/drawing/2014/main" id="{E7DAEDBF-C58A-73A9-2EFD-1B5054BEFB6A}"/>
+              </a:ext>
+            </a:extLst>
+          </p:cNvPr>
+          <p:cNvPicPr>
+            <a:picLocks noChangeAspect="1"/>
+          </p:cNvPicPr>
+          <p:nvPr/>
+        </p:nvPicPr>
+        <p:blipFill>
+          <a:blip r:embed="rId2"/>
+          <a:stretch>
+            <a:fillRect/>
+          </a:stretch>
+        </p:blipFill>
+        <p:spPr>
+          <a:xfrm>
+            <a:off x="1098914" y="1915914"/>
+            <a:ext cx="3505689" cy="3477110"/>
+          </a:xfrm>
+          <a:prstGeom prst="rect">
+            <a:avLst/>
+          </a:prstGeom>
+        </p:spPr>
+      </p:pic>
+      <p:pic>
+        <p:nvPicPr>
+          <p:cNvPr id="9" name="Picture 8">
+            <a:extLst>
+              <a:ext uri="{FF2B5EF4-FFF2-40B4-BE49-F238E27FC236}">
+                <a16:creationId xmlns:a16="http://schemas.microsoft.com/office/drawing/2014/main" id="{826AB262-DBED-4B2E-4F5E-3A6DA977C561}"/>
+              </a:ext>
+            </a:extLst>
+          </p:cNvPr>
+          <p:cNvPicPr>
+            <a:picLocks noChangeAspect="1"/>
+          </p:cNvPicPr>
+          <p:nvPr/>
+        </p:nvPicPr>
+        <p:blipFill>
+          <a:blip r:embed="rId3"/>
+          <a:stretch>
+            <a:fillRect/>
+          </a:stretch>
+        </p:blipFill>
+        <p:spPr>
+          <a:xfrm>
+            <a:off x="6863359" y="1960138"/>
+            <a:ext cx="3600953" cy="3477110"/>
+          </a:xfrm>
+          <a:prstGeom prst="rect">
+            <a:avLst/>
+          </a:prstGeom>
+        </p:spPr>
+      </p:pic>
+      <p:sp>
+        <p:nvSpPr>
+          <p:cNvPr id="10" name="TextBox 9">
+            <a:extLst>
+              <a:ext uri="{FF2B5EF4-FFF2-40B4-BE49-F238E27FC236}">
+                <a16:creationId xmlns:a16="http://schemas.microsoft.com/office/drawing/2014/main" id="{5528D8B4-F4A2-C081-5234-5ECEB551D467}"/>
+              </a:ext>
+            </a:extLst>
+          </p:cNvPr>
+          <p:cNvSpPr txBox="1"/>
+          <p:nvPr/>
+        </p:nvSpPr>
+        <p:spPr>
+          <a:xfrm>
+            <a:off x="2273474" y="1590806"/>
+            <a:ext cx="1591333" cy="369332"/>
+          </a:xfrm>
+          <a:prstGeom prst="rect">
+            <a:avLst/>
+          </a:prstGeom>
+          <a:noFill/>
+        </p:spPr>
+        <p:txBody>
+          <a:bodyPr wrap="none" rtlCol="0">
+            <a:spAutoFit/>
+          </a:bodyPr>
+          <a:lstStyle/>
+          <a:p>
+            <a:r>
+              <a:rPr lang="en-US" dirty="0"/>
+              <a:t>Velocity profile</a:t>
+            </a:r>
+            <a:endParaRPr lang="en-NL" dirty="0"/>
+          </a:p>
+        </p:txBody>
+      </p:sp>
+      <p:sp>
+        <p:nvSpPr>
+          <p:cNvPr id="11" name="TextBox 10">
+            <a:extLst>
+              <a:ext uri="{FF2B5EF4-FFF2-40B4-BE49-F238E27FC236}">
+                <a16:creationId xmlns:a16="http://schemas.microsoft.com/office/drawing/2014/main" id="{84E46194-7632-BEC2-C976-3E7310C06208}"/>
+              </a:ext>
+            </a:extLst>
+          </p:cNvPr>
+          <p:cNvSpPr txBox="1"/>
+          <p:nvPr/>
+        </p:nvSpPr>
+        <p:spPr>
+          <a:xfrm>
+            <a:off x="8400789" y="1590806"/>
+            <a:ext cx="1334083" cy="369332"/>
+          </a:xfrm>
+          <a:prstGeom prst="rect">
+            <a:avLst/>
+          </a:prstGeom>
+          <a:noFill/>
+        </p:spPr>
+        <p:txBody>
+          <a:bodyPr wrap="none" rtlCol="0">
+            <a:spAutoFit/>
+          </a:bodyPr>
+          <a:lstStyle/>
+          <a:p>
+            <a:r>
+              <a:rPr lang="en-US" dirty="0"/>
+              <a:t>Seismogram</a:t>
+            </a:r>
+            <a:endParaRPr lang="en-NL" dirty="0"/>
+          </a:p>
+        </p:txBody>
+      </p:sp>
+      <p:sp>
+        <p:nvSpPr>
+          <p:cNvPr id="12" name="Arrow: Right 11">
+            <a:extLst>
+              <a:ext uri="{FF2B5EF4-FFF2-40B4-BE49-F238E27FC236}">
+                <a16:creationId xmlns:a16="http://schemas.microsoft.com/office/drawing/2014/main" id="{2DFE67DA-3A28-7B4F-0083-08FAA1E14C02}"/>
+              </a:ext>
+            </a:extLst>
+          </p:cNvPr>
+          <p:cNvSpPr/>
+          <p:nvPr/>
+        </p:nvSpPr>
+        <p:spPr>
+          <a:xfrm>
+            <a:off x="4841309" y="2135688"/>
+            <a:ext cx="2090943" cy="1121079"/>
+          </a:xfrm>
+          <a:prstGeom prst="rightArrow">
+            <a:avLst/>
+          </a:prstGeom>
+        </p:spPr>
+        <p:style>
+          <a:lnRef idx="2">
+            <a:schemeClr val="accent1">
+              <a:shade val="15000"/>
+            </a:schemeClr>
+          </a:lnRef>
+          <a:fillRef idx="1">
+            <a:schemeClr val="accent1"/>
+          </a:fillRef>
+          <a:effectRef idx="0">
+            <a:schemeClr val="accent1"/>
+          </a:effectRef>
+          <a:fontRef idx="minor">
+            <a:schemeClr val="lt1"/>
+          </a:fontRef>
+        </p:style>
+        <p:txBody>
+          <a:bodyPr rtlCol="0" anchor="ctr"/>
+          <a:lstStyle/>
+          <a:p>
+            <a:pPr algn="ctr"/>
+            <a:r>
+              <a:rPr lang="en-US" sz="3000" b="1" dirty="0"/>
+              <a:t>Easy</a:t>
+            </a:r>
+            <a:endParaRPr lang="en-NL" sz="3000" b="1" dirty="0"/>
+          </a:p>
+        </p:txBody>
+      </p:sp>
+      <p:sp>
+        <p:nvSpPr>
+          <p:cNvPr id="13" name="Arrow: Right 12">
+            <a:extLst>
+              <a:ext uri="{FF2B5EF4-FFF2-40B4-BE49-F238E27FC236}">
+                <a16:creationId xmlns:a16="http://schemas.microsoft.com/office/drawing/2014/main" id="{79F62C2B-098D-AB59-1908-022BCE4769F1}"/>
+              </a:ext>
+            </a:extLst>
+          </p:cNvPr>
+          <p:cNvSpPr/>
+          <p:nvPr/>
+        </p:nvSpPr>
+        <p:spPr>
+          <a:xfrm rot="10800000" flipV="1">
+            <a:off x="4772416" y="3786468"/>
+            <a:ext cx="2090943" cy="1121079"/>
+          </a:xfrm>
+          <a:prstGeom prst="rightArrow">
+            <a:avLst/>
+          </a:prstGeom>
+        </p:spPr>
+        <p:style>
+          <a:lnRef idx="2">
+            <a:schemeClr val="accent1">
+              <a:shade val="15000"/>
+            </a:schemeClr>
+          </a:lnRef>
+          <a:fillRef idx="1">
+            <a:schemeClr val="accent1"/>
+          </a:fillRef>
+          <a:effectRef idx="0">
+            <a:schemeClr val="accent1"/>
+          </a:effectRef>
+          <a:fontRef idx="minor">
+            <a:schemeClr val="lt1"/>
+          </a:fontRef>
+        </p:style>
+        <p:txBody>
+          <a:bodyPr rtlCol="0" anchor="ctr"/>
+          <a:lstStyle/>
+          <a:p>
+            <a:pPr algn="ctr"/>
+            <a:r>
+              <a:rPr lang="en-US" sz="3000" b="1" dirty="0"/>
+              <a:t>Hard</a:t>
+            </a:r>
+            <a:endParaRPr lang="en-NL" sz="3000" b="1" dirty="0"/>
+          </a:p>
+        </p:txBody>
+      </p:sp>
     </p:spTree>
     <p:extLst>
       <p:ext uri="{BB962C8B-B14F-4D97-AF65-F5344CB8AC3E}">

</xml_diff>